<commit_message>
financial analysis assignment minor fixes
</commit_message>
<xml_diff>
--- a/semester C/Financial_Analysis/Kri-Kri-Analysis-Koutsompinas.pptx
+++ b/semester C/Financial_Analysis/Kri-Kri-Analysis-Koutsompinas.pptx
@@ -22600,7 +22600,7 @@
           <a:p>
             <a:fld id="{63A1C593-65D0-4073-BCC9-577B9352EA97}" type="datetimeFigureOut">
               <a:rPr lang="en-US" smtClean="0"/>
-              <a:t>12/30/2025</a:t>
+              <a:t>1/1/2026</a:t>
             </a:fld>
             <a:endParaRPr lang="en-US"/>
           </a:p>
@@ -22658,13 +22658,13 @@
   <p:clrMapOvr>
     <a:masterClrMapping/>
   </p:clrMapOvr>
-  <mc:AlternateContent xmlns:mc="http://schemas.openxmlformats.org/markup-compatibility/2006">
-    <mc:Choice xmlns:p159="http://schemas.microsoft.com/office/powerpoint/2015/09/main" Requires="p159">
+  <mc:AlternateContent xmlns:mc="http://schemas.openxmlformats.org/markup-compatibility/2006" xmlns:p159="http://schemas.microsoft.com/office/powerpoint/2015/09/main">
+    <mc:Choice Requires="p159">
       <p:transition>
         <p159:morph option="byObject"/>
       </p:transition>
     </mc:Choice>
-    <mc:Fallback>
+    <mc:Fallback xmlns="">
       <p:transition>
         <p:fade/>
       </p:transition>
@@ -22863,7 +22863,7 @@
           <a:p>
             <a:fld id="{63A1C593-65D0-4073-BCC9-577B9352EA97}" type="datetimeFigureOut">
               <a:rPr lang="en-US" smtClean="0"/>
-              <a:t>12/30/2025</a:t>
+              <a:t>1/1/2026</a:t>
             </a:fld>
             <a:endParaRPr lang="en-US"/>
           </a:p>
@@ -22921,13 +22921,13 @@
   <p:clrMapOvr>
     <a:masterClrMapping/>
   </p:clrMapOvr>
-  <mc:AlternateContent xmlns:mc="http://schemas.openxmlformats.org/markup-compatibility/2006">
-    <mc:Choice xmlns:p159="http://schemas.microsoft.com/office/powerpoint/2015/09/main" Requires="p159">
+  <mc:AlternateContent xmlns:mc="http://schemas.openxmlformats.org/markup-compatibility/2006" xmlns:p159="http://schemas.microsoft.com/office/powerpoint/2015/09/main">
+    <mc:Choice Requires="p159">
       <p:transition>
         <p159:morph option="byObject"/>
       </p:transition>
     </mc:Choice>
-    <mc:Fallback>
+    <mc:Fallback xmlns="">
       <p:transition>
         <p:fade/>
       </p:transition>
@@ -23189,7 +23189,7 @@
           <a:p>
             <a:fld id="{63A1C593-65D0-4073-BCC9-577B9352EA97}" type="datetimeFigureOut">
               <a:rPr lang="en-US" smtClean="0"/>
-              <a:t>12/30/2025</a:t>
+              <a:t>1/1/2026</a:t>
             </a:fld>
             <a:endParaRPr lang="en-US"/>
           </a:p>
@@ -23323,13 +23323,13 @@
   <p:clrMapOvr>
     <a:masterClrMapping/>
   </p:clrMapOvr>
-  <mc:AlternateContent xmlns:mc="http://schemas.openxmlformats.org/markup-compatibility/2006">
-    <mc:Choice xmlns:p159="http://schemas.microsoft.com/office/powerpoint/2015/09/main" Requires="p159">
+  <mc:AlternateContent xmlns:mc="http://schemas.openxmlformats.org/markup-compatibility/2006" xmlns:p159="http://schemas.microsoft.com/office/powerpoint/2015/09/main">
+    <mc:Choice Requires="p159">
       <p:transition>
         <p159:morph option="byObject"/>
       </p:transition>
     </mc:Choice>
-    <mc:Fallback>
+    <mc:Fallback xmlns="">
       <p:transition>
         <p:fade/>
       </p:transition>
@@ -23528,7 +23528,7 @@
           <a:p>
             <a:fld id="{63A1C593-65D0-4073-BCC9-577B9352EA97}" type="datetimeFigureOut">
               <a:rPr lang="en-US" smtClean="0"/>
-              <a:t>12/30/2025</a:t>
+              <a:t>1/1/2026</a:t>
             </a:fld>
             <a:endParaRPr lang="en-US"/>
           </a:p>
@@ -23586,13 +23586,13 @@
   <p:clrMapOvr>
     <a:masterClrMapping/>
   </p:clrMapOvr>
-  <mc:AlternateContent xmlns:mc="http://schemas.openxmlformats.org/markup-compatibility/2006">
-    <mc:Choice xmlns:p159="http://schemas.microsoft.com/office/powerpoint/2015/09/main" Requires="p159">
+  <mc:AlternateContent xmlns:mc="http://schemas.openxmlformats.org/markup-compatibility/2006" xmlns:p159="http://schemas.microsoft.com/office/powerpoint/2015/09/main">
+    <mc:Choice Requires="p159">
       <p:transition>
         <p159:morph option="byObject"/>
       </p:transition>
     </mc:Choice>
-    <mc:Fallback>
+    <mc:Fallback xmlns="">
       <p:transition>
         <p:fade/>
       </p:transition>
@@ -23854,7 +23854,7 @@
           <a:p>
             <a:fld id="{63A1C593-65D0-4073-BCC9-577B9352EA97}" type="datetimeFigureOut">
               <a:rPr lang="en-US" smtClean="0"/>
-              <a:t>12/30/2025</a:t>
+              <a:t>1/1/2026</a:t>
             </a:fld>
             <a:endParaRPr lang="en-US"/>
           </a:p>
@@ -23988,13 +23988,13 @@
   <p:clrMapOvr>
     <a:masterClrMapping/>
   </p:clrMapOvr>
-  <mc:AlternateContent xmlns:mc="http://schemas.openxmlformats.org/markup-compatibility/2006">
-    <mc:Choice xmlns:p159="http://schemas.microsoft.com/office/powerpoint/2015/09/main" Requires="p159">
+  <mc:AlternateContent xmlns:mc="http://schemas.openxmlformats.org/markup-compatibility/2006" xmlns:p159="http://schemas.microsoft.com/office/powerpoint/2015/09/main">
+    <mc:Choice Requires="p159">
       <p:transition>
         <p159:morph option="byObject"/>
       </p:transition>
     </mc:Choice>
-    <mc:Fallback>
+    <mc:Fallback xmlns="">
       <p:transition>
         <p:fade/>
       </p:transition>
@@ -24253,7 +24253,7 @@
           <a:p>
             <a:fld id="{63A1C593-65D0-4073-BCC9-577B9352EA97}" type="datetimeFigureOut">
               <a:rPr lang="en-US" smtClean="0"/>
-              <a:t>12/30/2025</a:t>
+              <a:t>1/1/2026</a:t>
             </a:fld>
             <a:endParaRPr lang="en-US"/>
           </a:p>
@@ -24311,13 +24311,13 @@
   <p:clrMapOvr>
     <a:masterClrMapping/>
   </p:clrMapOvr>
-  <mc:AlternateContent xmlns:mc="http://schemas.openxmlformats.org/markup-compatibility/2006">
-    <mc:Choice xmlns:p159="http://schemas.microsoft.com/office/powerpoint/2015/09/main" Requires="p159">
+  <mc:AlternateContent xmlns:mc="http://schemas.openxmlformats.org/markup-compatibility/2006" xmlns:p159="http://schemas.microsoft.com/office/powerpoint/2015/09/main">
+    <mc:Choice Requires="p159">
       <p:transition>
         <p159:morph option="byObject"/>
       </p:transition>
     </mc:Choice>
-    <mc:Fallback>
+    <mc:Fallback xmlns="">
       <p:transition>
         <p:fade/>
       </p:transition>
@@ -24435,7 +24435,7 @@
           <a:p>
             <a:fld id="{63A1C593-65D0-4073-BCC9-577B9352EA97}" type="datetimeFigureOut">
               <a:rPr lang="en-US" smtClean="0"/>
-              <a:t>12/30/2025</a:t>
+              <a:t>1/1/2026</a:t>
             </a:fld>
             <a:endParaRPr lang="en-US"/>
           </a:p>
@@ -24493,13 +24493,13 @@
   <p:clrMapOvr>
     <a:masterClrMapping/>
   </p:clrMapOvr>
-  <mc:AlternateContent xmlns:mc="http://schemas.openxmlformats.org/markup-compatibility/2006">
-    <mc:Choice xmlns:p159="http://schemas.microsoft.com/office/powerpoint/2015/09/main" Requires="p159">
+  <mc:AlternateContent xmlns:mc="http://schemas.openxmlformats.org/markup-compatibility/2006" xmlns:p159="http://schemas.microsoft.com/office/powerpoint/2015/09/main">
+    <mc:Choice Requires="p159">
       <p:transition>
         <p159:morph option="byObject"/>
       </p:transition>
     </mc:Choice>
-    <mc:Fallback>
+    <mc:Fallback xmlns="">
       <p:transition>
         <p:fade/>
       </p:transition>
@@ -24627,7 +24627,7 @@
           <a:p>
             <a:fld id="{63A1C593-65D0-4073-BCC9-577B9352EA97}" type="datetimeFigureOut">
               <a:rPr lang="en-US" smtClean="0"/>
-              <a:t>12/30/2025</a:t>
+              <a:t>1/1/2026</a:t>
             </a:fld>
             <a:endParaRPr lang="en-US"/>
           </a:p>
@@ -24685,13 +24685,13 @@
   <p:clrMapOvr>
     <a:masterClrMapping/>
   </p:clrMapOvr>
-  <mc:AlternateContent xmlns:mc="http://schemas.openxmlformats.org/markup-compatibility/2006">
-    <mc:Choice xmlns:p159="http://schemas.microsoft.com/office/powerpoint/2015/09/main" Requires="p159">
+  <mc:AlternateContent xmlns:mc="http://schemas.openxmlformats.org/markup-compatibility/2006" xmlns:p159="http://schemas.microsoft.com/office/powerpoint/2015/09/main">
+    <mc:Choice Requires="p159">
       <p:transition>
         <p159:morph option="byObject"/>
       </p:transition>
     </mc:Choice>
-    <mc:Fallback>
+    <mc:Fallback xmlns="">
       <p:transition>
         <p:fade/>
       </p:transition>
@@ -24815,7 +24815,7 @@
           <a:p>
             <a:fld id="{63A1C593-65D0-4073-BCC9-577B9352EA97}" type="datetimeFigureOut">
               <a:rPr lang="en-US" smtClean="0"/>
-              <a:t>12/30/2025</a:t>
+              <a:t>1/1/2026</a:t>
             </a:fld>
             <a:endParaRPr lang="en-US"/>
           </a:p>
@@ -24873,13 +24873,13 @@
   <p:clrMapOvr>
     <a:masterClrMapping/>
   </p:clrMapOvr>
-  <mc:AlternateContent xmlns:mc="http://schemas.openxmlformats.org/markup-compatibility/2006">
-    <mc:Choice xmlns:p159="http://schemas.microsoft.com/office/powerpoint/2015/09/main" Requires="p159">
+  <mc:AlternateContent xmlns:mc="http://schemas.openxmlformats.org/markup-compatibility/2006" xmlns:p159="http://schemas.microsoft.com/office/powerpoint/2015/09/main">
+    <mc:Choice Requires="p159">
       <p:transition>
         <p159:morph option="byObject"/>
       </p:transition>
     </mc:Choice>
-    <mc:Fallback>
+    <mc:Fallback xmlns="">
       <p:transition>
         <p:fade/>
       </p:transition>
@@ -25074,7 +25074,7 @@
           <a:p>
             <a:fld id="{63A1C593-65D0-4073-BCC9-577B9352EA97}" type="datetimeFigureOut">
               <a:rPr lang="en-US" smtClean="0"/>
-              <a:t>12/30/2025</a:t>
+              <a:t>1/1/2026</a:t>
             </a:fld>
             <a:endParaRPr lang="en-US"/>
           </a:p>
@@ -25132,13 +25132,13 @@
   <p:clrMapOvr>
     <a:masterClrMapping/>
   </p:clrMapOvr>
-  <mc:AlternateContent xmlns:mc="http://schemas.openxmlformats.org/markup-compatibility/2006">
-    <mc:Choice xmlns:p159="http://schemas.microsoft.com/office/powerpoint/2015/09/main" Requires="p159">
+  <mc:AlternateContent xmlns:mc="http://schemas.openxmlformats.org/markup-compatibility/2006" xmlns:p159="http://schemas.microsoft.com/office/powerpoint/2015/09/main">
+    <mc:Choice Requires="p159">
       <p:transition>
         <p159:morph option="byObject"/>
       </p:transition>
     </mc:Choice>
-    <mc:Fallback>
+    <mc:Fallback xmlns="">
       <p:transition>
         <p:fade/>
       </p:transition>
@@ -25318,7 +25318,7 @@
           <a:p>
             <a:fld id="{63A1C593-65D0-4073-BCC9-577B9352EA97}" type="datetimeFigureOut">
               <a:rPr lang="en-US" smtClean="0"/>
-              <a:t>12/30/2025</a:t>
+              <a:t>1/1/2026</a:t>
             </a:fld>
             <a:endParaRPr lang="en-US"/>
           </a:p>
@@ -25376,13 +25376,13 @@
   <p:clrMapOvr>
     <a:masterClrMapping/>
   </p:clrMapOvr>
-  <mc:AlternateContent xmlns:mc="http://schemas.openxmlformats.org/markup-compatibility/2006">
-    <mc:Choice xmlns:p159="http://schemas.microsoft.com/office/powerpoint/2015/09/main" Requires="p159">
+  <mc:AlternateContent xmlns:mc="http://schemas.openxmlformats.org/markup-compatibility/2006" xmlns:p159="http://schemas.microsoft.com/office/powerpoint/2015/09/main">
+    <mc:Choice Requires="p159">
       <p:transition>
         <p159:morph option="byObject"/>
       </p:transition>
     </mc:Choice>
-    <mc:Fallback>
+    <mc:Fallback xmlns="">
       <p:transition>
         <p:fade/>
       </p:transition>
@@ -25704,7 +25704,7 @@
           <a:p>
             <a:fld id="{63A1C593-65D0-4073-BCC9-577B9352EA97}" type="datetimeFigureOut">
               <a:rPr lang="en-US" smtClean="0"/>
-              <a:t>12/30/2025</a:t>
+              <a:t>1/1/2026</a:t>
             </a:fld>
             <a:endParaRPr lang="en-US"/>
           </a:p>
@@ -25762,13 +25762,13 @@
   <p:clrMapOvr>
     <a:masterClrMapping/>
   </p:clrMapOvr>
-  <mc:AlternateContent xmlns:mc="http://schemas.openxmlformats.org/markup-compatibility/2006">
-    <mc:Choice xmlns:p159="http://schemas.microsoft.com/office/powerpoint/2015/09/main" Requires="p159">
+  <mc:AlternateContent xmlns:mc="http://schemas.openxmlformats.org/markup-compatibility/2006" xmlns:p159="http://schemas.microsoft.com/office/powerpoint/2015/09/main">
+    <mc:Choice Requires="p159">
       <p:transition>
         <p159:morph option="byObject"/>
       </p:transition>
     </mc:Choice>
-    <mc:Fallback>
+    <mc:Fallback xmlns="">
       <p:transition>
         <p:fade/>
       </p:transition>
@@ -25839,7 +25839,7 @@
           <a:p>
             <a:fld id="{63A1C593-65D0-4073-BCC9-577B9352EA97}" type="datetimeFigureOut">
               <a:rPr lang="en-US" smtClean="0"/>
-              <a:t>12/30/2025</a:t>
+              <a:t>1/1/2026</a:t>
             </a:fld>
             <a:endParaRPr lang="en-US"/>
           </a:p>
@@ -25897,13 +25897,13 @@
   <p:clrMapOvr>
     <a:masterClrMapping/>
   </p:clrMapOvr>
-  <mc:AlternateContent xmlns:mc="http://schemas.openxmlformats.org/markup-compatibility/2006">
-    <mc:Choice xmlns:p159="http://schemas.microsoft.com/office/powerpoint/2015/09/main" Requires="p159">
+  <mc:AlternateContent xmlns:mc="http://schemas.openxmlformats.org/markup-compatibility/2006" xmlns:p159="http://schemas.microsoft.com/office/powerpoint/2015/09/main">
+    <mc:Choice Requires="p159">
       <p:transition>
         <p159:morph option="byObject"/>
       </p:transition>
     </mc:Choice>
-    <mc:Fallback>
+    <mc:Fallback xmlns="">
       <p:transition>
         <p:fade/>
       </p:transition>
@@ -25946,7 +25946,7 @@
           <a:p>
             <a:fld id="{63A1C593-65D0-4073-BCC9-577B9352EA97}" type="datetimeFigureOut">
               <a:rPr lang="en-US" smtClean="0"/>
-              <a:t>12/30/2025</a:t>
+              <a:t>1/1/2026</a:t>
             </a:fld>
             <a:endParaRPr lang="en-US"/>
           </a:p>
@@ -26004,13 +26004,13 @@
   <p:clrMapOvr>
     <a:masterClrMapping/>
   </p:clrMapOvr>
-  <mc:AlternateContent xmlns:mc="http://schemas.openxmlformats.org/markup-compatibility/2006">
-    <mc:Choice xmlns:p159="http://schemas.microsoft.com/office/powerpoint/2015/09/main" Requires="p159">
+  <mc:AlternateContent xmlns:mc="http://schemas.openxmlformats.org/markup-compatibility/2006" xmlns:p159="http://schemas.microsoft.com/office/powerpoint/2015/09/main">
+    <mc:Choice Requires="p159">
       <p:transition>
         <p159:morph option="byObject"/>
       </p:transition>
     </mc:Choice>
-    <mc:Fallback>
+    <mc:Fallback xmlns="">
       <p:transition>
         <p:fade/>
       </p:transition>
@@ -26213,7 +26213,7 @@
           <a:p>
             <a:fld id="{63A1C593-65D0-4073-BCC9-577B9352EA97}" type="datetimeFigureOut">
               <a:rPr lang="en-US" smtClean="0"/>
-              <a:t>12/30/2025</a:t>
+              <a:t>1/1/2026</a:t>
             </a:fld>
             <a:endParaRPr lang="en-US"/>
           </a:p>
@@ -26271,13 +26271,13 @@
   <p:clrMapOvr>
     <a:masterClrMapping/>
   </p:clrMapOvr>
-  <mc:AlternateContent xmlns:mc="http://schemas.openxmlformats.org/markup-compatibility/2006">
-    <mc:Choice xmlns:p159="http://schemas.microsoft.com/office/powerpoint/2015/09/main" Requires="p159">
+  <mc:AlternateContent xmlns:mc="http://schemas.openxmlformats.org/markup-compatibility/2006" xmlns:p159="http://schemas.microsoft.com/office/powerpoint/2015/09/main">
+    <mc:Choice Requires="p159">
       <p:transition>
         <p159:morph option="byObject"/>
       </p:transition>
     </mc:Choice>
-    <mc:Fallback>
+    <mc:Fallback xmlns="">
       <p:transition>
         <p:fade/>
       </p:transition>
@@ -26488,7 +26488,7 @@
           <a:p>
             <a:fld id="{63A1C593-65D0-4073-BCC9-577B9352EA97}" type="datetimeFigureOut">
               <a:rPr lang="en-US" smtClean="0"/>
-              <a:t>12/30/2025</a:t>
+              <a:t>1/1/2026</a:t>
             </a:fld>
             <a:endParaRPr lang="en-US"/>
           </a:p>
@@ -26546,13 +26546,13 @@
   <p:clrMapOvr>
     <a:masterClrMapping/>
   </p:clrMapOvr>
-  <mc:AlternateContent xmlns:mc="http://schemas.openxmlformats.org/markup-compatibility/2006">
-    <mc:Choice xmlns:p159="http://schemas.microsoft.com/office/powerpoint/2015/09/main" Requires="p159">
+  <mc:AlternateContent xmlns:mc="http://schemas.openxmlformats.org/markup-compatibility/2006" xmlns:p159="http://schemas.microsoft.com/office/powerpoint/2015/09/main">
+    <mc:Choice Requires="p159">
       <p:transition>
         <p159:morph option="byObject"/>
       </p:transition>
     </mc:Choice>
-    <mc:Fallback>
+    <mc:Fallback xmlns="">
       <p:transition>
         <p:fade/>
       </p:transition>
@@ -27301,7 +27301,7 @@
           <a:p>
             <a:fld id="{63A1C593-65D0-4073-BCC9-577B9352EA97}" type="datetimeFigureOut">
               <a:rPr lang="en-US" smtClean="0"/>
-              <a:t>12/30/2025</a:t>
+              <a:t>1/1/2026</a:t>
             </a:fld>
             <a:endParaRPr lang="en-US"/>
           </a:p>
@@ -27409,13 +27409,13 @@
     <p:sldLayoutId id="2147483757" r:id="rId15"/>
     <p:sldLayoutId id="2147483758" r:id="rId16"/>
   </p:sldLayoutIdLst>
-  <mc:AlternateContent xmlns:mc="http://schemas.openxmlformats.org/markup-compatibility/2006">
-    <mc:Choice xmlns:p159="http://schemas.microsoft.com/office/powerpoint/2015/09/main" Requires="p159">
+  <mc:AlternateContent xmlns:mc="http://schemas.openxmlformats.org/markup-compatibility/2006" xmlns:p159="http://schemas.microsoft.com/office/powerpoint/2015/09/main">
+    <mc:Choice Requires="p159">
       <p:transition>
         <p159:morph option="byObject"/>
       </p:transition>
     </mc:Choice>
-    <mc:Fallback>
+    <mc:Fallback xmlns="">
       <p:transition>
         <p:fade/>
       </p:transition>
@@ -28675,13 +28675,13 @@
   <p:clrMapOvr>
     <a:masterClrMapping/>
   </p:clrMapOvr>
-  <mc:AlternateContent xmlns:mc="http://schemas.openxmlformats.org/markup-compatibility/2006">
-    <mc:Choice xmlns:p159="http://schemas.microsoft.com/office/powerpoint/2015/09/main" Requires="p159">
+  <mc:AlternateContent xmlns:mc="http://schemas.openxmlformats.org/markup-compatibility/2006" xmlns:p159="http://schemas.microsoft.com/office/powerpoint/2015/09/main">
+    <mc:Choice Requires="p159">
       <p:transition>
         <p159:morph option="byObject"/>
       </p:transition>
     </mc:Choice>
-    <mc:Fallback>
+    <mc:Fallback xmlns="">
       <p:transition>
         <p:fade/>
       </p:transition>
@@ -29787,13 +29787,13 @@
   <p:clrMapOvr>
     <a:masterClrMapping/>
   </p:clrMapOvr>
-  <mc:AlternateContent xmlns:mc="http://schemas.openxmlformats.org/markup-compatibility/2006">
-    <mc:Choice xmlns:p159="http://schemas.microsoft.com/office/powerpoint/2015/09/main" Requires="p159">
+  <mc:AlternateContent xmlns:mc="http://schemas.openxmlformats.org/markup-compatibility/2006" xmlns:p159="http://schemas.microsoft.com/office/powerpoint/2015/09/main">
+    <mc:Choice Requires="p159">
       <p:transition>
         <p159:morph option="byObject"/>
       </p:transition>
     </mc:Choice>
-    <mc:Fallback>
+    <mc:Fallback xmlns="">
       <p:transition>
         <p:fade/>
       </p:transition>
@@ -30590,13 +30590,13 @@
   <p:clrMapOvr>
     <a:masterClrMapping/>
   </p:clrMapOvr>
-  <mc:AlternateContent xmlns:mc="http://schemas.openxmlformats.org/markup-compatibility/2006">
-    <mc:Choice xmlns:p159="http://schemas.microsoft.com/office/powerpoint/2015/09/main" Requires="p159">
+  <mc:AlternateContent xmlns:mc="http://schemas.openxmlformats.org/markup-compatibility/2006" xmlns:p159="http://schemas.microsoft.com/office/powerpoint/2015/09/main">
+    <mc:Choice Requires="p159">
       <p:transition>
         <p159:morph option="byObject"/>
       </p:transition>
     </mc:Choice>
-    <mc:Fallback>
+    <mc:Fallback xmlns="">
       <p:transition>
         <p:fade/>
       </p:transition>
@@ -31448,13 +31448,13 @@
   <p:clrMapOvr>
     <a:masterClrMapping/>
   </p:clrMapOvr>
-  <mc:AlternateContent xmlns:mc="http://schemas.openxmlformats.org/markup-compatibility/2006">
-    <mc:Choice xmlns:p159="http://schemas.microsoft.com/office/powerpoint/2015/09/main" Requires="p159">
+  <mc:AlternateContent xmlns:mc="http://schemas.openxmlformats.org/markup-compatibility/2006" xmlns:p159="http://schemas.microsoft.com/office/powerpoint/2015/09/main">
+    <mc:Choice Requires="p159">
       <p:transition>
         <p159:morph option="byObject"/>
       </p:transition>
     </mc:Choice>
-    <mc:Fallback>
+    <mc:Fallback xmlns="">
       <p:transition>
         <p:fade/>
       </p:transition>
@@ -32441,13 +32441,13 @@
   <p:clrMapOvr>
     <a:masterClrMapping/>
   </p:clrMapOvr>
-  <mc:AlternateContent xmlns:mc="http://schemas.openxmlformats.org/markup-compatibility/2006">
-    <mc:Choice xmlns:p159="http://schemas.microsoft.com/office/powerpoint/2015/09/main" Requires="p159">
+  <mc:AlternateContent xmlns:mc="http://schemas.openxmlformats.org/markup-compatibility/2006" xmlns:p159="http://schemas.microsoft.com/office/powerpoint/2015/09/main">
+    <mc:Choice Requires="p159">
       <p:transition>
         <p159:morph option="byObject"/>
       </p:transition>
     </mc:Choice>
-    <mc:Fallback>
+    <mc:Fallback xmlns="">
       <p:transition>
         <p:fade/>
       </p:transition>
@@ -32797,13 +32797,13 @@
   <p:clrMapOvr>
     <a:masterClrMapping/>
   </p:clrMapOvr>
-  <mc:AlternateContent xmlns:mc="http://schemas.openxmlformats.org/markup-compatibility/2006">
-    <mc:Choice xmlns:p159="http://schemas.microsoft.com/office/powerpoint/2015/09/main" Requires="p159">
+  <mc:AlternateContent xmlns:mc="http://schemas.openxmlformats.org/markup-compatibility/2006" xmlns:p159="http://schemas.microsoft.com/office/powerpoint/2015/09/main">
+    <mc:Choice Requires="p159">
       <p:transition>
         <p159:morph option="byObject"/>
       </p:transition>
     </mc:Choice>
-    <mc:Fallback>
+    <mc:Fallback xmlns="">
       <p:transition>
         <p:fade/>
       </p:transition>
@@ -33008,13 +33008,13 @@
   <p:clrMapOvr>
     <a:masterClrMapping/>
   </p:clrMapOvr>
-  <mc:AlternateContent xmlns:mc="http://schemas.openxmlformats.org/markup-compatibility/2006">
-    <mc:Choice xmlns:p159="http://schemas.microsoft.com/office/powerpoint/2015/09/main" Requires="p159">
+  <mc:AlternateContent xmlns:mc="http://schemas.openxmlformats.org/markup-compatibility/2006" xmlns:p159="http://schemas.microsoft.com/office/powerpoint/2015/09/main">
+    <mc:Choice Requires="p159">
       <p:transition>
         <p159:morph option="byObject"/>
       </p:transition>
     </mc:Choice>
-    <mc:Fallback>
+    <mc:Fallback xmlns="">
       <p:transition>
         <p:fade/>
       </p:transition>
@@ -34919,13 +34919,13 @@
   <p:clrMapOvr>
     <a:masterClrMapping/>
   </p:clrMapOvr>
-  <mc:AlternateContent xmlns:mc="http://schemas.openxmlformats.org/markup-compatibility/2006">
-    <mc:Choice xmlns:p159="http://schemas.microsoft.com/office/powerpoint/2015/09/main" Requires="p159">
+  <mc:AlternateContent xmlns:mc="http://schemas.openxmlformats.org/markup-compatibility/2006" xmlns:p159="http://schemas.microsoft.com/office/powerpoint/2015/09/main">
+    <mc:Choice Requires="p159">
       <p:transition>
         <p159:morph option="byObject"/>
       </p:transition>
     </mc:Choice>
-    <mc:Fallback>
+    <mc:Fallback xmlns="">
       <p:transition>
         <p:fade/>
       </p:transition>
@@ -35287,13 +35287,13 @@
   <p:clrMapOvr>
     <a:masterClrMapping/>
   </p:clrMapOvr>
-  <mc:AlternateContent xmlns:mc="http://schemas.openxmlformats.org/markup-compatibility/2006">
-    <mc:Choice xmlns:p159="http://schemas.microsoft.com/office/powerpoint/2015/09/main" Requires="p159">
+  <mc:AlternateContent xmlns:mc="http://schemas.openxmlformats.org/markup-compatibility/2006" xmlns:p159="http://schemas.microsoft.com/office/powerpoint/2015/09/main">
+    <mc:Choice Requires="p159">
       <p:transition>
         <p159:morph option="byObject"/>
       </p:transition>
     </mc:Choice>
-    <mc:Fallback>
+    <mc:Fallback xmlns="">
       <p:transition>
         <p:fade/>
       </p:transition>
@@ -35543,13 +35543,13 @@
   <p:clrMapOvr>
     <a:masterClrMapping/>
   </p:clrMapOvr>
-  <mc:AlternateContent xmlns:mc="http://schemas.openxmlformats.org/markup-compatibility/2006">
-    <mc:Choice xmlns:p159="http://schemas.microsoft.com/office/powerpoint/2015/09/main" Requires="p159">
+  <mc:AlternateContent xmlns:mc="http://schemas.openxmlformats.org/markup-compatibility/2006" xmlns:p159="http://schemas.microsoft.com/office/powerpoint/2015/09/main">
+    <mc:Choice Requires="p159">
       <p:transition>
         <p159:morph option="byObject"/>
       </p:transition>
     </mc:Choice>
-    <mc:Fallback>
+    <mc:Fallback xmlns="">
       <p:transition>
         <p:fade/>
       </p:transition>
@@ -37855,13 +37855,13 @@
   <p:clrMapOvr>
     <a:masterClrMapping/>
   </p:clrMapOvr>
-  <mc:AlternateContent xmlns:mc="http://schemas.openxmlformats.org/markup-compatibility/2006">
-    <mc:Choice xmlns:p159="http://schemas.microsoft.com/office/powerpoint/2015/09/main" Requires="p159">
+  <mc:AlternateContent xmlns:mc="http://schemas.openxmlformats.org/markup-compatibility/2006" xmlns:p159="http://schemas.microsoft.com/office/powerpoint/2015/09/main">
+    <mc:Choice Requires="p159">
       <p:transition>
         <p159:morph option="byObject"/>
       </p:transition>
     </mc:Choice>
-    <mc:Fallback>
+    <mc:Fallback xmlns="">
       <p:transition>
         <p:fade/>
       </p:transition>
@@ -38015,13 +38015,13 @@
   <p:clrMapOvr>
     <a:masterClrMapping/>
   </p:clrMapOvr>
-  <mc:AlternateContent xmlns:mc="http://schemas.openxmlformats.org/markup-compatibility/2006">
-    <mc:Choice xmlns:p159="http://schemas.microsoft.com/office/powerpoint/2015/09/main" Requires="p159">
+  <mc:AlternateContent xmlns:mc="http://schemas.openxmlformats.org/markup-compatibility/2006" xmlns:p159="http://schemas.microsoft.com/office/powerpoint/2015/09/main">
+    <mc:Choice Requires="p159">
       <p:transition>
         <p159:morph option="byObject"/>
       </p:transition>
     </mc:Choice>
-    <mc:Fallback>
+    <mc:Fallback xmlns="">
       <p:transition>
         <p:fade/>
       </p:transition>
@@ -38411,13 +38411,13 @@
   <p:clrMapOvr>
     <a:masterClrMapping/>
   </p:clrMapOvr>
-  <mc:AlternateContent xmlns:mc="http://schemas.openxmlformats.org/markup-compatibility/2006">
-    <mc:Choice xmlns:p159="http://schemas.microsoft.com/office/powerpoint/2015/09/main" Requires="p159">
+  <mc:AlternateContent xmlns:mc="http://schemas.openxmlformats.org/markup-compatibility/2006" xmlns:p159="http://schemas.microsoft.com/office/powerpoint/2015/09/main">
+    <mc:Choice Requires="p159">
       <p:transition>
         <p159:morph option="byObject"/>
       </p:transition>
     </mc:Choice>
-    <mc:Fallback>
+    <mc:Fallback xmlns="">
       <p:transition>
         <p:fade/>
       </p:transition>
@@ -38633,13 +38633,13 @@
   <p:clrMapOvr>
     <a:masterClrMapping/>
   </p:clrMapOvr>
-  <mc:AlternateContent xmlns:mc="http://schemas.openxmlformats.org/markup-compatibility/2006">
-    <mc:Choice xmlns:p159="http://schemas.microsoft.com/office/powerpoint/2015/09/main" Requires="p159">
+  <mc:AlternateContent xmlns:mc="http://schemas.openxmlformats.org/markup-compatibility/2006" xmlns:p159="http://schemas.microsoft.com/office/powerpoint/2015/09/main">
+    <mc:Choice Requires="p159">
       <p:transition>
         <p159:morph option="byObject"/>
       </p:transition>
     </mc:Choice>
-    <mc:Fallback>
+    <mc:Fallback xmlns="">
       <p:transition>
         <p:fade/>
       </p:transition>
@@ -38847,13 +38847,13 @@
   <p:clrMapOvr>
     <a:masterClrMapping/>
   </p:clrMapOvr>
-  <mc:AlternateContent xmlns:mc="http://schemas.openxmlformats.org/markup-compatibility/2006">
-    <mc:Choice xmlns:p159="http://schemas.microsoft.com/office/powerpoint/2015/09/main" Requires="p159">
+  <mc:AlternateContent xmlns:mc="http://schemas.openxmlformats.org/markup-compatibility/2006" xmlns:p159="http://schemas.microsoft.com/office/powerpoint/2015/09/main">
+    <mc:Choice Requires="p159">
       <p:transition>
         <p159:morph option="byObject"/>
       </p:transition>
     </mc:Choice>
-    <mc:Fallback>
+    <mc:Fallback xmlns="">
       <p:transition>
         <p:fade/>
       </p:transition>
@@ -38983,13 +38983,13 @@
   <p:clrMapOvr>
     <a:masterClrMapping/>
   </p:clrMapOvr>
-  <mc:AlternateContent xmlns:mc="http://schemas.openxmlformats.org/markup-compatibility/2006">
-    <mc:Choice xmlns:p159="http://schemas.microsoft.com/office/powerpoint/2015/09/main" Requires="p159">
+  <mc:AlternateContent xmlns:mc="http://schemas.openxmlformats.org/markup-compatibility/2006" xmlns:p159="http://schemas.microsoft.com/office/powerpoint/2015/09/main">
+    <mc:Choice Requires="p159">
       <p:transition>
         <p159:morph option="byObject"/>
       </p:transition>
     </mc:Choice>
-    <mc:Fallback>
+    <mc:Fallback xmlns="">
       <p:transition>
         <p:fade/>
       </p:transition>
@@ -39250,13 +39250,13 @@
   <p:clrMapOvr>
     <a:masterClrMapping/>
   </p:clrMapOvr>
-  <mc:AlternateContent xmlns:mc="http://schemas.openxmlformats.org/markup-compatibility/2006">
-    <mc:Choice xmlns:p159="http://schemas.microsoft.com/office/powerpoint/2015/09/main" Requires="p159">
+  <mc:AlternateContent xmlns:mc="http://schemas.openxmlformats.org/markup-compatibility/2006" xmlns:p159="http://schemas.microsoft.com/office/powerpoint/2015/09/main">
+    <mc:Choice Requires="p159">
       <p:transition>
         <p159:morph option="byObject"/>
       </p:transition>
     </mc:Choice>
-    <mc:Fallback>
+    <mc:Fallback xmlns="">
       <p:transition>
         <p:fade/>
       </p:transition>
@@ -39519,13 +39519,13 @@
   <p:clrMapOvr>
     <a:masterClrMapping/>
   </p:clrMapOvr>
-  <mc:AlternateContent xmlns:mc="http://schemas.openxmlformats.org/markup-compatibility/2006">
-    <mc:Choice xmlns:p159="http://schemas.microsoft.com/office/powerpoint/2015/09/main" Requires="p159">
+  <mc:AlternateContent xmlns:mc="http://schemas.openxmlformats.org/markup-compatibility/2006" xmlns:p159="http://schemas.microsoft.com/office/powerpoint/2015/09/main">
+    <mc:Choice Requires="p159">
       <p:transition>
         <p159:morph option="byObject"/>
       </p:transition>
     </mc:Choice>
-    <mc:Fallback>
+    <mc:Fallback xmlns="">
       <p:transition>
         <p:fade/>
       </p:transition>
@@ -39800,116 +39800,190 @@
           </a:p>
         </p:txBody>
       </p:sp>
-      <p:sp>
-        <p:nvSpPr>
-          <p:cNvPr id="4" name="Content Placeholder 3">
-            <a:extLst>
-              <a:ext uri="{FF2B5EF4-FFF2-40B4-BE49-F238E27FC236}">
-                <a16:creationId xmlns:a16="http://schemas.microsoft.com/office/drawing/2014/main" id="{E5999615-685C-65D6-DB7A-BC4C3797EF64}"/>
-              </a:ext>
-            </a:extLst>
-          </p:cNvPr>
-          <p:cNvSpPr>
-            <a:spLocks noGrp="1"/>
-          </p:cNvSpPr>
-          <p:nvPr>
-            <p:ph idx="1"/>
-          </p:nvPr>
-        </p:nvSpPr>
-        <p:spPr>
-          <a:xfrm>
-            <a:off x="1358469" y="1862009"/>
-            <a:ext cx="9539686" cy="4165567"/>
-          </a:xfrm>
-        </p:spPr>
-        <p:txBody>
-          <a:bodyPr/>
-          <a:lstStyle/>
-          <a:p>
-            <a:pPr marL="0" lvl="0" indent="0">
-              <a:buNone/>
-            </a:pPr>
-            <a:r>
-              <a:rPr lang="el-GR" b="1" dirty="0"/>
-              <a:t>Σημειώσεις:</a:t>
-            </a:r>
-            <a:endParaRPr lang="en-US" dirty="0"/>
-          </a:p>
-          <a:p>
-            <a:r>
-              <a:rPr lang="el-GR" dirty="0"/>
-              <a:t>Για τον συντελεστή </a:t>
-            </a:r>
-            <a:r>
-              <a:rPr lang="en-US" dirty="0"/>
-              <a:t>beta</a:t>
-            </a:r>
-            <a:r>
-              <a:rPr lang="el-GR" dirty="0"/>
-              <a:t> χρησιμοποιήσαμε </a:t>
-            </a:r>
-            <a:r>
-              <a:rPr lang="en-US" dirty="0"/>
-              <a:t>regression </a:t>
-            </a:r>
-            <a:r>
-              <a:rPr lang="el-GR" dirty="0"/>
-              <a:t>μεταξύ των εβδομαδιαίων αποδόσεων της ΚΡΙ-ΚΡΙ και του δείκτη χρηματιστηρίου Αθηνών (δείκτης </a:t>
-            </a:r>
-            <a:r>
-              <a:rPr lang="en-US" dirty="0"/>
-              <a:t>ATG</a:t>
-            </a:r>
-            <a:r>
-              <a:rPr lang="el-GR" dirty="0"/>
-              <a:t>).</a:t>
-            </a:r>
-            <a:endParaRPr lang="en-US" dirty="0"/>
-          </a:p>
-          <a:p>
-            <a:r>
-              <a:rPr lang="el-GR" dirty="0"/>
-              <a:t>Επιλέγουμε εβδομαδιαίες αποδόσεις δεδομένα, προκειμένου να περιοριστεί ο βραχυπρόθεσμος «θόρυβος» και να αποτυπωθεί καλύτερα η συστηματική μεταβλητότητα. </a:t>
-            </a:r>
-            <a:r>
-              <a:rPr lang="en-US" dirty="0"/>
-              <a:t>(</a:t>
-            </a:r>
-            <a:r>
-              <a:rPr lang="el-GR" dirty="0"/>
-              <a:t>Ο υπολογισμός με ημερήσιες αποδόσεις δίνει παρόμοια τιμή, επιβεβαιώνοντας τη σταθερότητα του αποτελέσματος.</a:t>
-            </a:r>
-            <a:r>
-              <a:rPr lang="en-US" dirty="0"/>
-              <a:t>)</a:t>
-            </a:r>
-          </a:p>
-          <a:p>
-            <a:r>
-              <a:rPr lang="el-GR" dirty="0"/>
-              <a:t>Υπολογίσαμε τα </a:t>
-            </a:r>
-            <a:r>
-              <a:rPr lang="en-US" dirty="0"/>
-              <a:t>beta</a:t>
-            </a:r>
-            <a:r>
-              <a:rPr lang="el-GR" dirty="0"/>
-              <a:t> τόσο σε ετήσια βάση (από το 2020 έως το 2024) όσο και σε ένα ενιαίο διάστημα (01/01/2020 – 21/12/2025)</a:t>
-            </a:r>
-            <a:r>
-              <a:rPr lang="en-US" dirty="0"/>
-              <a:t>.</a:t>
-            </a:r>
-          </a:p>
-          <a:p>
-            <a:endParaRPr lang="en-US" dirty="0"/>
-          </a:p>
-          <a:p>
-            <a:endParaRPr lang="en-US" dirty="0"/>
-          </a:p>
-        </p:txBody>
-      </p:sp>
+      <mc:AlternateContent xmlns:mc="http://schemas.openxmlformats.org/markup-compatibility/2006">
+        <mc:Choice xmlns:a14="http://schemas.microsoft.com/office/drawing/2010/main" Requires="a14">
+          <p:sp>
+            <p:nvSpPr>
+              <p:cNvPr id="4" name="Content Placeholder 3">
+                <a:extLst>
+                  <a:ext uri="{FF2B5EF4-FFF2-40B4-BE49-F238E27FC236}">
+                    <a16:creationId xmlns:a16="http://schemas.microsoft.com/office/drawing/2014/main" id="{E5999615-685C-65D6-DB7A-BC4C3797EF64}"/>
+                  </a:ext>
+                </a:extLst>
+              </p:cNvPr>
+              <p:cNvSpPr>
+                <a:spLocks noGrp="1"/>
+              </p:cNvSpPr>
+              <p:nvPr>
+                <p:ph idx="1"/>
+              </p:nvPr>
+            </p:nvSpPr>
+            <p:spPr>
+              <a:xfrm>
+                <a:off x="1358469" y="1862009"/>
+                <a:ext cx="9539686" cy="4165567"/>
+              </a:xfrm>
+            </p:spPr>
+            <p:txBody>
+              <a:bodyPr/>
+              <a:lstStyle/>
+              <a:p>
+                <a:pPr marL="0" lvl="0" indent="0">
+                  <a:buNone/>
+                </a:pPr>
+                <a:r>
+                  <a:rPr lang="el-GR" b="1" dirty="0"/>
+                  <a:t>Σημειώσεις:</a:t>
+                </a:r>
+                <a:endParaRPr lang="en-US" dirty="0"/>
+              </a:p>
+              <a:p>
+                <a:r>
+                  <a:rPr lang="el-GR" dirty="0"/>
+                  <a:t>Για τον συντελεστή </a:t>
+                </a:r>
+                <a:r>
+                  <a:rPr lang="en-US" dirty="0"/>
+                  <a:t>beta</a:t>
+                </a:r>
+                <a:r>
+                  <a:rPr lang="el-GR" dirty="0"/>
+                  <a:t> χρησιμοποιήσαμε </a:t>
+                </a:r>
+                <a:r>
+                  <a:rPr lang="en-US" dirty="0"/>
+                  <a:t>regression </a:t>
+                </a:r>
+                <a:r>
+                  <a:rPr lang="el-GR" dirty="0"/>
+                  <a:t>μεταξύ των εβδομαδιαίων αποδόσεων της ΚΡΙ-ΚΡΙ και του δείκτη χρηματιστηρίου Αθηνών (δείκτης </a:t>
+                </a:r>
+                <a:r>
+                  <a:rPr lang="en-US" dirty="0"/>
+                  <a:t>ATG</a:t>
+                </a:r>
+                <a:r>
+                  <a:rPr lang="el-GR" dirty="0"/>
+                  <a:t>).</a:t>
+                </a:r>
+                <a:endParaRPr lang="en-US" dirty="0"/>
+              </a:p>
+              <a:p>
+                <a:r>
+                  <a:rPr lang="el-GR" dirty="0"/>
+                  <a:t>Επιλέγουμε εβδομαδιαίες αποδόσεις δεδομένα, προκειμένου να περιοριστεί ο βραχυπρόθεσμος «θόρυβος» και να αποτυπωθεί καλύτερα η συστημική μεταβλητότητα. </a:t>
+                </a:r>
+                <a:r>
+                  <a:rPr lang="en-US" dirty="0"/>
+                  <a:t>(</a:t>
+                </a:r>
+                <a:r>
+                  <a:rPr lang="el-GR" dirty="0"/>
+                  <a:t>Ο υπολογισμός με ημερήσιες αποδόσεις δίνει παρόμοια τιμή με ελαφρώς χαμηλότερο </a:t>
+                </a:r>
+                <a14:m>
+                  <m:oMath xmlns:m="http://schemas.openxmlformats.org/officeDocument/2006/math">
+                    <m:sSup>
+                      <m:sSupPr>
+                        <m:ctrlPr>
+                          <a:rPr lang="en-US" b="0" i="1" smtClean="0">
+                            <a:latin typeface="Cambria Math" panose="02040503050406030204" pitchFamily="18" charset="0"/>
+                          </a:rPr>
+                        </m:ctrlPr>
+                      </m:sSupPr>
+                      <m:e>
+                        <m:r>
+                          <a:rPr lang="en-US" b="0" i="1" smtClean="0">
+                            <a:latin typeface="Cambria Math" panose="02040503050406030204" pitchFamily="18" charset="0"/>
+                          </a:rPr>
+                          <m:t>𝑅</m:t>
+                        </m:r>
+                      </m:e>
+                      <m:sup>
+                        <m:r>
+                          <a:rPr lang="en-US" b="0" i="1" smtClean="0">
+                            <a:latin typeface="Cambria Math" panose="02040503050406030204" pitchFamily="18" charset="0"/>
+                          </a:rPr>
+                          <m:t>2</m:t>
+                        </m:r>
+                      </m:sup>
+                    </m:sSup>
+                  </m:oMath>
+                </a14:m>
+                <a:r>
+                  <a:rPr lang="el-GR" dirty="0"/>
+                  <a:t>, επιβεβαιώνοντας τη σταθερότητα του αποτελέσματος.</a:t>
+                </a:r>
+                <a:r>
+                  <a:rPr lang="en-US" dirty="0"/>
+                  <a:t>)</a:t>
+                </a:r>
+              </a:p>
+              <a:p>
+                <a:r>
+                  <a:rPr lang="el-GR" dirty="0"/>
+                  <a:t>Υπολογίσαμε τα </a:t>
+                </a:r>
+                <a:r>
+                  <a:rPr lang="en-US" dirty="0"/>
+                  <a:t>beta</a:t>
+                </a:r>
+                <a:r>
+                  <a:rPr lang="el-GR" dirty="0"/>
+                  <a:t> τόσο σε ετήσια βάση (από το 2020 έως το 2024) όσο και σε ένα ενιαίο διάστημα (01/01/2020 – 21/12/2025)</a:t>
+                </a:r>
+                <a:r>
+                  <a:rPr lang="en-US" dirty="0"/>
+                  <a:t>.</a:t>
+                </a:r>
+              </a:p>
+            </p:txBody>
+          </p:sp>
+        </mc:Choice>
+        <mc:Fallback>
+          <p:sp>
+            <p:nvSpPr>
+              <p:cNvPr id="4" name="Content Placeholder 3">
+                <a:extLst>
+                  <a:ext uri="{FF2B5EF4-FFF2-40B4-BE49-F238E27FC236}">
+                    <a16:creationId xmlns:a16="http://schemas.microsoft.com/office/drawing/2014/main" id="{E5999615-685C-65D6-DB7A-BC4C3797EF64}"/>
+                  </a:ext>
+                </a:extLst>
+              </p:cNvPr>
+              <p:cNvSpPr>
+                <a:spLocks noGrp="1" noRot="1" noChangeAspect="1" noMove="1" noResize="1" noEditPoints="1" noAdjustHandles="1" noChangeArrowheads="1" noChangeShapeType="1" noTextEdit="1"/>
+              </p:cNvSpPr>
+              <p:nvPr>
+                <p:ph idx="1"/>
+              </p:nvPr>
+            </p:nvSpPr>
+            <p:spPr>
+              <a:xfrm>
+                <a:off x="1358469" y="1862009"/>
+                <a:ext cx="9539686" cy="4165567"/>
+              </a:xfrm>
+              <a:blipFill>
+                <a:blip r:embed="rId2"/>
+                <a:stretch>
+                  <a:fillRect l="-575" t="-877" r="-511"/>
+                </a:stretch>
+              </a:blipFill>
+            </p:spPr>
+            <p:txBody>
+              <a:bodyPr/>
+              <a:lstStyle/>
+              <a:p>
+                <a:r>
+                  <a:rPr lang="en-US">
+                    <a:noFill/>
+                  </a:rPr>
+                  <a:t> </a:t>
+                </a:r>
+              </a:p>
+            </p:txBody>
+          </p:sp>
+        </mc:Fallback>
+      </mc:AlternateContent>
     </p:spTree>
     <p:extLst>
       <p:ext uri="{BB962C8B-B14F-4D97-AF65-F5344CB8AC3E}">
@@ -39920,13 +39994,13 @@
   <p:clrMapOvr>
     <a:masterClrMapping/>
   </p:clrMapOvr>
-  <mc:AlternateContent xmlns:mc="http://schemas.openxmlformats.org/markup-compatibility/2006">
-    <mc:Choice xmlns:p159="http://schemas.microsoft.com/office/powerpoint/2015/09/main" Requires="p159">
+  <mc:AlternateContent xmlns:mc="http://schemas.openxmlformats.org/markup-compatibility/2006" xmlns:p159="http://schemas.microsoft.com/office/powerpoint/2015/09/main">
+    <mc:Choice Requires="p159">
       <p:transition>
         <p159:morph option="byObject"/>
       </p:transition>
     </mc:Choice>
-    <mc:Fallback>
+    <mc:Fallback xmlns="">
       <p:transition>
         <p:fade/>
       </p:transition>
@@ -39960,8 +40034,8 @@
           <a:chExt cx="0" cy="0"/>
         </a:xfrm>
       </p:grpSpPr>
-      <mc:AlternateContent xmlns:mc="http://schemas.openxmlformats.org/markup-compatibility/2006">
-        <mc:Choice xmlns:a14="http://schemas.microsoft.com/office/drawing/2010/main" Requires="a14">
+      <mc:AlternateContent xmlns:mc="http://schemas.openxmlformats.org/markup-compatibility/2006" xmlns:a14="http://schemas.microsoft.com/office/drawing/2010/main">
+        <mc:Choice Requires="a14">
           <p:graphicFrame>
             <p:nvGraphicFramePr>
               <p:cNvPr id="4" name="Content Placeholder 3">
@@ -39985,7 +40059,7 @@
             </p:nvGraphicFramePr>
             <p:xfrm>
               <a:off x="919164" y="463000"/>
-              <a:ext cx="10353672" cy="1113600"/>
+              <a:ext cx="10353672" cy="1112520"/>
             </p:xfrm>
             <a:graphic>
               <a:graphicData uri="http://schemas.openxmlformats.org/drawingml/2006/table">
@@ -40281,10 +40355,11 @@
                                 <m:sSup>
                                   <m:sSupPr>
                                     <m:ctrlPr>
-                                      <a:rPr lang="en-US" b="0" smtClean="0">
+                                      <a:rPr lang="en-US" b="0" i="1" smtClean="0">
                                         <a:solidFill>
                                           <a:schemeClr val="bg1"/>
                                         </a:solidFill>
+                                        <a:latin typeface="Cambria Math" panose="02040503050406030204" pitchFamily="18" charset="0"/>
                                       </a:rPr>
                                     </m:ctrlPr>
                                   </m:sSupPr>
@@ -40294,6 +40369,7 @@
                                         <a:solidFill>
                                           <a:schemeClr val="bg1"/>
                                         </a:solidFill>
+                                        <a:latin typeface="Cambria Math" panose="02040503050406030204" pitchFamily="18" charset="0"/>
                                       </a:rPr>
                                       <m:t>𝑅</m:t>
                                     </m:r>
@@ -40304,6 +40380,7 @@
                                         <a:solidFill>
                                           <a:schemeClr val="bg1"/>
                                         </a:solidFill>
+                                        <a:latin typeface="Cambria Math" panose="02040503050406030204" pitchFamily="18" charset="0"/>
                                       </a:rPr>
                                       <m:t>2</m:t>
                                     </m:r>
@@ -40447,7 +40524,7 @@
             </a:graphic>
           </p:graphicFrame>
         </mc:Choice>
-        <mc:Fallback>
+        <mc:Fallback xmlns="">
           <p:graphicFrame>
             <p:nvGraphicFramePr>
               <p:cNvPr id="4" name="Content Placeholder 3">
@@ -40937,8 +41014,8 @@
           </a:p>
         </p:txBody>
       </p:sp>
-      <mc:AlternateContent xmlns:mc="http://schemas.openxmlformats.org/markup-compatibility/2006">
-        <mc:Choice xmlns:a14="http://schemas.microsoft.com/office/drawing/2010/main" Requires="a14">
+      <mc:AlternateContent xmlns:mc="http://schemas.openxmlformats.org/markup-compatibility/2006" xmlns:a14="http://schemas.microsoft.com/office/drawing/2010/main">
+        <mc:Choice Requires="a14">
           <p:graphicFrame>
             <p:nvGraphicFramePr>
               <p:cNvPr id="7" name="Table 6">
@@ -41015,10 +41092,11 @@
                                 <m:sSup>
                                   <m:sSupPr>
                                     <m:ctrlPr>
-                                      <a:rPr lang="en-US" b="1" smtClean="0">
+                                      <a:rPr lang="en-US" b="1" i="1" smtClean="0">
                                         <a:solidFill>
                                           <a:schemeClr val="tx1"/>
                                         </a:solidFill>
+                                        <a:latin typeface="Cambria Math" panose="02040503050406030204" pitchFamily="18" charset="0"/>
                                       </a:rPr>
                                     </m:ctrlPr>
                                   </m:sSupPr>
@@ -41028,6 +41106,7 @@
                                         <a:solidFill>
                                           <a:schemeClr val="tx1"/>
                                         </a:solidFill>
+                                        <a:latin typeface="Cambria Math" panose="02040503050406030204" pitchFamily="18" charset="0"/>
                                       </a:rPr>
                                       <m:t>𝑹</m:t>
                                     </m:r>
@@ -41038,6 +41117,7 @@
                                         <a:solidFill>
                                           <a:schemeClr val="tx1"/>
                                         </a:solidFill>
+                                        <a:latin typeface="Cambria Math" panose="02040503050406030204" pitchFamily="18" charset="0"/>
                                       </a:rPr>
                                       <m:t>𝟐</m:t>
                                     </m:r>
@@ -41097,7 +41177,7 @@
             </a:graphic>
           </p:graphicFrame>
         </mc:Choice>
-        <mc:Fallback>
+        <mc:Fallback xmlns="">
           <p:graphicFrame>
             <p:nvGraphicFramePr>
               <p:cNvPr id="7" name="Table 6">
@@ -41263,13 +41343,13 @@
   <p:clrMapOvr>
     <a:masterClrMapping/>
   </p:clrMapOvr>
-  <mc:AlternateContent xmlns:mc="http://schemas.openxmlformats.org/markup-compatibility/2006">
-    <mc:Choice xmlns:p159="http://schemas.microsoft.com/office/powerpoint/2015/09/main" Requires="p159">
+  <mc:AlternateContent xmlns:mc="http://schemas.openxmlformats.org/markup-compatibility/2006" xmlns:p159="http://schemas.microsoft.com/office/powerpoint/2015/09/main">
+    <mc:Choice Requires="p159">
       <p:transition>
         <p159:morph option="byObject"/>
       </p:transition>
     </mc:Choice>
-    <mc:Fallback>
+    <mc:Fallback xmlns="">
       <p:transition>
         <p:fade/>
       </p:transition>
@@ -41454,7 +41534,7 @@
             </p:spPr>
             <p:txBody>
               <a:bodyPr>
-                <a:normAutofit fontScale="92500"/>
+                <a:normAutofit fontScale="92500" lnSpcReduction="20000"/>
               </a:bodyPr>
               <a:lstStyle/>
               <a:p>
@@ -41479,6 +41559,52 @@
                   <a:t>:</a:t>
                 </a:r>
                 <a:endParaRPr lang="en-US" sz="2400" dirty="0">
+                  <a:latin typeface="Times New Roman" panose="02020603050405020304" pitchFamily="18" charset="0"/>
+                  <a:cs typeface="Times New Roman" panose="02020603050405020304" pitchFamily="18" charset="0"/>
+                </a:endParaRPr>
+              </a:p>
+              <a:p>
+                <a:pPr>
+                  <a:lnSpc>
+                    <a:spcPct val="90000"/>
+                  </a:lnSpc>
+                </a:pPr>
+                <a:r>
+                  <a:rPr lang="el-GR" dirty="0">
+                    <a:latin typeface="Times New Roman" panose="02020603050405020304" pitchFamily="18" charset="0"/>
+                    <a:cs typeface="Times New Roman" panose="02020603050405020304" pitchFamily="18" charset="0"/>
+                  </a:rPr>
+                  <a:t>Στους μεταγενέστερους υπολογισμούς χρησιμοποιείται το </a:t>
+                </a:r>
+                <a:r>
+                  <a:rPr lang="el-GR" dirty="0" err="1">
+                    <a:latin typeface="Times New Roman" panose="02020603050405020304" pitchFamily="18" charset="0"/>
+                    <a:cs typeface="Times New Roman" panose="02020603050405020304" pitchFamily="18" charset="0"/>
+                  </a:rPr>
+                  <a:t>beta</a:t>
+                </a:r>
+                <a:r>
+                  <a:rPr lang="el-GR" dirty="0">
+                    <a:latin typeface="Times New Roman" panose="02020603050405020304" pitchFamily="18" charset="0"/>
+                    <a:cs typeface="Times New Roman" panose="02020603050405020304" pitchFamily="18" charset="0"/>
+                  </a:rPr>
+                  <a:t> της 6ετίας, καθώς αποτυπώνει πιο αξιόπιστα τη μακροχρόνια συμπεριφορά της μετοχής έναντι της αγοράς, μειώνοντας την επίδραση βραχυχρόνιων διακυμάνσεων και θορύβου στα ετήσια </a:t>
+                </a:r>
+                <a:r>
+                  <a:rPr lang="el-GR" dirty="0" err="1">
+                    <a:latin typeface="Times New Roman" panose="02020603050405020304" pitchFamily="18" charset="0"/>
+                    <a:cs typeface="Times New Roman" panose="02020603050405020304" pitchFamily="18" charset="0"/>
+                  </a:rPr>
+                  <a:t>beta</a:t>
+                </a:r>
+                <a:r>
+                  <a:rPr lang="el-GR" dirty="0">
+                    <a:latin typeface="Times New Roman" panose="02020603050405020304" pitchFamily="18" charset="0"/>
+                    <a:cs typeface="Times New Roman" panose="02020603050405020304" pitchFamily="18" charset="0"/>
+                  </a:rPr>
+                  <a:t>.</a:t>
+                </a:r>
+                <a:endParaRPr lang="en-US" dirty="0">
                   <a:latin typeface="Times New Roman" panose="02020603050405020304" pitchFamily="18" charset="0"/>
                   <a:cs typeface="Times New Roman" panose="02020603050405020304" pitchFamily="18" charset="0"/>
                 </a:endParaRPr>
@@ -41642,7 +41768,7 @@
                     <a:latin typeface="Times New Roman" panose="02020603050405020304" pitchFamily="18" charset="0"/>
                     <a:cs typeface="Times New Roman" panose="02020603050405020304" pitchFamily="18" charset="0"/>
                   </a:rPr>
-                  <a:t> παραμένει κατάλληλο ως μέτρο συστηματικού κινδύνου για το CAPM, με ενίσχυση μέσω κλαδικών </a:t>
+                  <a:t> παραμένει κατάλληλο ως μέτρο συστημικού κινδύνου για το CAPM, με ενίσχυση μέσω κλαδικών </a:t>
                 </a:r>
                 <a:r>
                   <a:rPr lang="el-GR" sz="1800" b="0" dirty="0" err="1">
@@ -41773,7 +41899,7 @@
               <a:blipFill>
                 <a:blip r:embed="rId2"/>
                 <a:stretch>
-                  <a:fillRect l="-442" t="-1405" r="-63"/>
+                  <a:fillRect l="-442" t="-2576" r="-63"/>
                 </a:stretch>
               </a:blipFill>
             </p:spPr>
@@ -41867,13 +41993,13 @@
   <p:clrMapOvr>
     <a:masterClrMapping/>
   </p:clrMapOvr>
-  <mc:AlternateContent xmlns:mc="http://schemas.openxmlformats.org/markup-compatibility/2006">
-    <mc:Choice xmlns:p159="http://schemas.microsoft.com/office/powerpoint/2015/09/main" Requires="p159">
+  <mc:AlternateContent xmlns:mc="http://schemas.openxmlformats.org/markup-compatibility/2006" xmlns:p159="http://schemas.microsoft.com/office/powerpoint/2015/09/main">
+    <mc:Choice Requires="p159">
       <p:transition>
         <p159:morph option="byObject"/>
       </p:transition>
     </mc:Choice>
-    <mc:Fallback>
+    <mc:Fallback xmlns="">
       <p:transition>
         <p:fade/>
       </p:transition>
@@ -42197,13 +42323,13 @@
   <p:clrMapOvr>
     <a:masterClrMapping/>
   </p:clrMapOvr>
-  <mc:AlternateContent xmlns:mc="http://schemas.openxmlformats.org/markup-compatibility/2006">
-    <mc:Choice xmlns:p159="http://schemas.microsoft.com/office/powerpoint/2015/09/main" Requires="p159">
+  <mc:AlternateContent xmlns:mc="http://schemas.openxmlformats.org/markup-compatibility/2006" xmlns:p159="http://schemas.microsoft.com/office/powerpoint/2015/09/main">
+    <mc:Choice Requires="p159">
       <p:transition>
         <p159:morph option="byObject"/>
       </p:transition>
     </mc:Choice>
-    <mc:Fallback>
+    <mc:Fallback xmlns="">
       <p:transition>
         <p:fade/>
       </p:transition>
@@ -42403,8 +42529,8 @@
           </a:p>
         </p:txBody>
       </p:sp>
-      <mc:AlternateContent xmlns:mc="http://schemas.openxmlformats.org/markup-compatibility/2006">
-        <mc:Choice xmlns:a14="http://schemas.microsoft.com/office/drawing/2010/main" Requires="a14">
+      <mc:AlternateContent xmlns:mc="http://schemas.openxmlformats.org/markup-compatibility/2006" xmlns:a14="http://schemas.microsoft.com/office/drawing/2010/main">
+        <mc:Choice Requires="a14">
           <p:sp>
             <p:nvSpPr>
               <p:cNvPr id="3" name="Content Placeholder 2">
@@ -43025,7 +43151,7 @@
             </p:txBody>
           </p:sp>
         </mc:Choice>
-        <mc:Fallback>
+        <mc:Fallback xmlns="">
           <p:sp>
             <p:nvSpPr>
               <p:cNvPr id="3" name="Content Placeholder 2">
@@ -43144,13 +43270,13 @@
   <p:clrMapOvr>
     <a:masterClrMapping/>
   </p:clrMapOvr>
-  <mc:AlternateContent xmlns:mc="http://schemas.openxmlformats.org/markup-compatibility/2006">
-    <mc:Choice xmlns:p159="http://schemas.microsoft.com/office/powerpoint/2015/09/main" Requires="p159">
+  <mc:AlternateContent xmlns:mc="http://schemas.openxmlformats.org/markup-compatibility/2006" xmlns:p159="http://schemas.microsoft.com/office/powerpoint/2015/09/main">
+    <mc:Choice Requires="p159">
       <p:transition>
         <p159:morph option="byObject"/>
       </p:transition>
     </mc:Choice>
-    <mc:Fallback>
+    <mc:Fallback xmlns="">
       <p:transition>
         <p:fade/>
       </p:transition>

</xml_diff>